<commit_message>
util - adding exercise
</commit_message>
<xml_diff>
--- a/EPICS-Util-Training.pptx
+++ b/EPICS-Util-Training.pptx
@@ -17,9 +17,10 @@
     <p:sldId id="374" r:id="rId11"/>
     <p:sldId id="375" r:id="rId12"/>
     <p:sldId id="366" r:id="rId13"/>
-    <p:sldId id="376" r:id="rId14"/>
-    <p:sldId id="377" r:id="rId15"/>
-    <p:sldId id="367" r:id="rId16"/>
+    <p:sldId id="377" r:id="rId14"/>
+    <p:sldId id="378" r:id="rId15"/>
+    <p:sldId id="376" r:id="rId16"/>
+    <p:sldId id="367" r:id="rId17"/>
   </p:sldIdLst>
   <p:sldSz cx="12192000" cy="6858000"/>
   <p:notesSz cx="6858000" cy="9144000"/>
@@ -3850,7 +3851,7 @@
           <p:cNvPr id="2" name="Title 1">
             <a:extLst>
               <a:ext uri="{FF2B5EF4-FFF2-40B4-BE49-F238E27FC236}">
-                <a16:creationId xmlns:a16="http://schemas.microsoft.com/office/drawing/2014/main" id="{77CA4CB1-D83D-4E45-9B7C-AE61F012D948}"/>
+                <a16:creationId xmlns:a16="http://schemas.microsoft.com/office/drawing/2014/main" id="{EC6BF568-A437-4B90-98C0-4989EAE314D1}"/>
               </a:ext>
             </a:extLst>
           </p:cNvPr>
@@ -3867,120 +3868,42 @@
           <a:lstStyle/>
           <a:p>
             <a:r>
-              <a:rPr lang="en-US" dirty="0"/>
-              <a:t>Basic interfaces</a:t>
-            </a:r>
-          </a:p>
-        </p:txBody>
-      </p:sp>
-      <p:sp>
-        <p:nvSpPr>
-          <p:cNvPr id="3" name="Content Placeholder 2">
-            <a:extLst>
-              <a:ext uri="{FF2B5EF4-FFF2-40B4-BE49-F238E27FC236}">
-                <a16:creationId xmlns:a16="http://schemas.microsoft.com/office/drawing/2014/main" id="{98D2A237-EDA1-47EA-B19C-222FD16B9C40}"/>
-              </a:ext>
-            </a:extLst>
-          </p:cNvPr>
-          <p:cNvSpPr>
-            <a:spLocks noGrp="1"/>
-          </p:cNvSpPr>
-          <p:nvPr>
-            <p:ph idx="1"/>
-          </p:nvPr>
-        </p:nvSpPr>
-        <p:spPr/>
-        <p:txBody>
-          <a:bodyPr>
-            <a:normAutofit fontScale="92500" lnSpcReduction="10000"/>
-          </a:bodyPr>
-          <a:lstStyle/>
-          <a:p>
-            <a:r>
-              <a:rPr lang="en-US" dirty="0"/>
-              <a:t>EPICS </a:t>
-            </a:r>
-            <a:r>
-              <a:rPr lang="en-US" dirty="0" err="1"/>
-              <a:t>util</a:t>
-            </a:r>
-            <a:r>
-              <a:rPr lang="en-US" dirty="0"/>
-              <a:t> provide a set of interfaces that are as much as possible similar to the Java Collection framework</a:t>
-            </a:r>
-          </a:p>
-          <a:p>
-            <a:r>
-              <a:rPr lang="en-US" dirty="0"/>
-              <a:t>The most basic interface is the </a:t>
-            </a:r>
-            <a:r>
-              <a:rPr lang="en-US" dirty="0" err="1"/>
-              <a:t>CollectionNumber</a:t>
-            </a:r>
-            <a:r>
-              <a:rPr lang="en-US" dirty="0"/>
-              <a:t> that, through the </a:t>
-            </a:r>
-            <a:r>
-              <a:rPr lang="en-US" dirty="0" err="1"/>
-              <a:t>IteratorNumber</a:t>
-            </a:r>
-            <a:r>
-              <a:rPr lang="en-US" dirty="0"/>
-              <a:t>, allows iteration through a generic collection of primitives </a:t>
-            </a:r>
-          </a:p>
-          <a:p>
-            <a:r>
-              <a:rPr lang="en-US" dirty="0" err="1"/>
-              <a:t>org.epics.util.array</a:t>
-            </a:r>
-            <a:r>
-              <a:rPr lang="en-US" dirty="0"/>
-              <a:t> provides support for numeric collections</a:t>
-            </a:r>
-          </a:p>
-          <a:p>
-            <a:pPr lvl="1"/>
-            <a:r>
-              <a:rPr lang="en-US" dirty="0"/>
-              <a:t>Allows iterating on a set of numbers regardless of their type</a:t>
-            </a:r>
-          </a:p>
-          <a:p>
-            <a:pPr lvl="1"/>
-            <a:r>
-              <a:rPr lang="en-US" dirty="0"/>
-              <a:t>Allows creating read-only wrappers</a:t>
-            </a:r>
-          </a:p>
-          <a:p>
-            <a:pPr lvl="1"/>
-            <a:r>
-              <a:rPr lang="en-US" dirty="0"/>
-              <a:t>Allows implementing arrays that are lazily calculated</a:t>
-            </a:r>
-          </a:p>
-          <a:p>
-            <a:pPr lvl="1"/>
-            <a:r>
-              <a:rPr lang="en-US" dirty="0"/>
-              <a:t>If using the concrete array implementations, the performance is guaranteed to be the same as using arrays directly</a:t>
-            </a:r>
-          </a:p>
-          <a:p>
-            <a:r>
-              <a:rPr lang="en-US" dirty="0"/>
-              <a:t>Includes interfaces/implementations for all 10 numeric types (2 floating point, 4 integers, 4 unsigned integers)</a:t>
-            </a:r>
+              <a:rPr lang="en-US"/>
+              <a:t>Example 2</a:t>
+            </a:r>
+            <a:endParaRPr lang="en-US" dirty="0"/>
+          </a:p>
+        </p:txBody>
+      </p:sp>
+      <p:sp>
+        <p:nvSpPr>
+          <p:cNvPr id="3" name="Text Placeholder 2">
+            <a:extLst>
+              <a:ext uri="{FF2B5EF4-FFF2-40B4-BE49-F238E27FC236}">
+                <a16:creationId xmlns:a16="http://schemas.microsoft.com/office/drawing/2014/main" id="{7A0D7A2E-D772-480E-9998-651DE339BCBA}"/>
+              </a:ext>
+            </a:extLst>
+          </p:cNvPr>
+          <p:cNvSpPr>
+            <a:spLocks noGrp="1"/>
+          </p:cNvSpPr>
+          <p:nvPr>
+            <p:ph type="body" idx="1"/>
+          </p:nvPr>
+        </p:nvSpPr>
+        <p:spPr/>
+        <p:txBody>
+          <a:bodyPr/>
+          <a:lstStyle/>
+          <a:p>
+            <a:endParaRPr lang="en-US"/>
           </a:p>
         </p:txBody>
       </p:sp>
     </p:spTree>
     <p:extLst>
       <p:ext uri="{BB962C8B-B14F-4D97-AF65-F5344CB8AC3E}">
-        <p14:creationId xmlns:p14="http://schemas.microsoft.com/office/powerpoint/2010/main" val="1240117095"/>
+        <p14:creationId xmlns:p14="http://schemas.microsoft.com/office/powerpoint/2010/main" val="245327185"/>
       </p:ext>
     </p:extLst>
   </p:cSld>
@@ -4012,7 +3935,7 @@
           <p:cNvPr id="2" name="Title 1">
             <a:extLst>
               <a:ext uri="{FF2B5EF4-FFF2-40B4-BE49-F238E27FC236}">
-                <a16:creationId xmlns:a16="http://schemas.microsoft.com/office/drawing/2014/main" id="{EC6BF568-A437-4B90-98C0-4989EAE314D1}"/>
+                <a16:creationId xmlns:a16="http://schemas.microsoft.com/office/drawing/2014/main" id="{9FA58AF1-5BB6-426B-88FE-5F93CF8DBF76}"/>
               </a:ext>
             </a:extLst>
           </p:cNvPr>
@@ -4029,42 +3952,60 @@
           <a:lstStyle/>
           <a:p>
             <a:r>
-              <a:rPr lang="en-US"/>
-              <a:t>Example 2</a:t>
-            </a:r>
-            <a:endParaRPr lang="en-US" dirty="0"/>
-          </a:p>
-        </p:txBody>
-      </p:sp>
-      <p:sp>
-        <p:nvSpPr>
-          <p:cNvPr id="3" name="Text Placeholder 2">
-            <a:extLst>
-              <a:ext uri="{FF2B5EF4-FFF2-40B4-BE49-F238E27FC236}">
-                <a16:creationId xmlns:a16="http://schemas.microsoft.com/office/drawing/2014/main" id="{7A0D7A2E-D772-480E-9998-651DE339BCBA}"/>
-              </a:ext>
-            </a:extLst>
-          </p:cNvPr>
-          <p:cNvSpPr>
-            <a:spLocks noGrp="1"/>
-          </p:cNvSpPr>
-          <p:nvPr>
-            <p:ph type="body" idx="1"/>
-          </p:nvPr>
-        </p:nvSpPr>
-        <p:spPr/>
-        <p:txBody>
-          <a:bodyPr/>
-          <a:lstStyle/>
-          <a:p>
-            <a:endParaRPr lang="en-US"/>
+              <a:rPr lang="en-US" dirty="0"/>
+              <a:t>Exercise 2a</a:t>
+            </a:r>
+          </a:p>
+        </p:txBody>
+      </p:sp>
+      <p:sp>
+        <p:nvSpPr>
+          <p:cNvPr id="3" name="Content Placeholder 2">
+            <a:extLst>
+              <a:ext uri="{FF2B5EF4-FFF2-40B4-BE49-F238E27FC236}">
+                <a16:creationId xmlns:a16="http://schemas.microsoft.com/office/drawing/2014/main" id="{3EF60512-6FF2-4913-8F04-13093AB9B9F1}"/>
+              </a:ext>
+            </a:extLst>
+          </p:cNvPr>
+          <p:cNvSpPr>
+            <a:spLocks noGrp="1"/>
+          </p:cNvSpPr>
+          <p:nvPr>
+            <p:ph idx="1"/>
+          </p:nvPr>
+        </p:nvSpPr>
+        <p:spPr/>
+        <p:txBody>
+          <a:bodyPr/>
+          <a:lstStyle/>
+          <a:p>
+            <a:r>
+              <a:rPr lang="en-US" dirty="0"/>
+              <a:t>Implement a </a:t>
+            </a:r>
+            <a:r>
+              <a:rPr lang="en-US" dirty="0" err="1"/>
+              <a:t>ListDouble</a:t>
+            </a:r>
+            <a:r>
+              <a:rPr lang="en-US" dirty="0"/>
+              <a:t> that lazily returns the reverse list of a given </a:t>
+            </a:r>
+            <a:r>
+              <a:rPr lang="en-US" dirty="0" err="1"/>
+              <a:t>ListNumber</a:t>
+            </a:r>
+            <a:r>
+              <a:rPr lang="en-US" dirty="0"/>
+              <a:t>.</a:t>
+            </a:r>
           </a:p>
         </p:txBody>
       </p:sp>
     </p:spTree>
     <p:extLst>
       <p:ext uri="{BB962C8B-B14F-4D97-AF65-F5344CB8AC3E}">
-        <p14:creationId xmlns:p14="http://schemas.microsoft.com/office/powerpoint/2010/main" val="245327185"/>
+        <p14:creationId xmlns:p14="http://schemas.microsoft.com/office/powerpoint/2010/main" val="2752112067"/>
       </p:ext>
     </p:extLst>
   </p:cSld>
@@ -4075,6 +4016,168 @@
 </file>
 
 <file path=ppt/slides/slide15.xml><?xml version="1.0" encoding="utf-8"?>
+<p:sld xmlns:a="http://schemas.openxmlformats.org/drawingml/2006/main" xmlns:r="http://schemas.openxmlformats.org/officeDocument/2006/relationships" xmlns:p="http://schemas.openxmlformats.org/presentationml/2006/main">
+  <p:cSld>
+    <p:spTree>
+      <p:nvGrpSpPr>
+        <p:cNvPr id="1" name=""/>
+        <p:cNvGrpSpPr/>
+        <p:nvPr/>
+      </p:nvGrpSpPr>
+      <p:grpSpPr>
+        <a:xfrm>
+          <a:off x="0" y="0"/>
+          <a:ext cx="0" cy="0"/>
+          <a:chOff x="0" y="0"/>
+          <a:chExt cx="0" cy="0"/>
+        </a:xfrm>
+      </p:grpSpPr>
+      <p:sp>
+        <p:nvSpPr>
+          <p:cNvPr id="2" name="Title 1">
+            <a:extLst>
+              <a:ext uri="{FF2B5EF4-FFF2-40B4-BE49-F238E27FC236}">
+                <a16:creationId xmlns:a16="http://schemas.microsoft.com/office/drawing/2014/main" id="{77CA4CB1-D83D-4E45-9B7C-AE61F012D948}"/>
+              </a:ext>
+            </a:extLst>
+          </p:cNvPr>
+          <p:cNvSpPr>
+            <a:spLocks noGrp="1"/>
+          </p:cNvSpPr>
+          <p:nvPr>
+            <p:ph type="title"/>
+          </p:nvPr>
+        </p:nvSpPr>
+        <p:spPr/>
+        <p:txBody>
+          <a:bodyPr/>
+          <a:lstStyle/>
+          <a:p>
+            <a:r>
+              <a:rPr lang="en-US" dirty="0"/>
+              <a:t>Basic interfaces</a:t>
+            </a:r>
+          </a:p>
+        </p:txBody>
+      </p:sp>
+      <p:sp>
+        <p:nvSpPr>
+          <p:cNvPr id="3" name="Content Placeholder 2">
+            <a:extLst>
+              <a:ext uri="{FF2B5EF4-FFF2-40B4-BE49-F238E27FC236}">
+                <a16:creationId xmlns:a16="http://schemas.microsoft.com/office/drawing/2014/main" id="{98D2A237-EDA1-47EA-B19C-222FD16B9C40}"/>
+              </a:ext>
+            </a:extLst>
+          </p:cNvPr>
+          <p:cNvSpPr>
+            <a:spLocks noGrp="1"/>
+          </p:cNvSpPr>
+          <p:nvPr>
+            <p:ph idx="1"/>
+          </p:nvPr>
+        </p:nvSpPr>
+        <p:spPr/>
+        <p:txBody>
+          <a:bodyPr>
+            <a:normAutofit fontScale="92500" lnSpcReduction="10000"/>
+          </a:bodyPr>
+          <a:lstStyle/>
+          <a:p>
+            <a:r>
+              <a:rPr lang="en-US" dirty="0"/>
+              <a:t>EPICS </a:t>
+            </a:r>
+            <a:r>
+              <a:rPr lang="en-US" dirty="0" err="1"/>
+              <a:t>util</a:t>
+            </a:r>
+            <a:r>
+              <a:rPr lang="en-US" dirty="0"/>
+              <a:t> provide a set of interfaces that are as much as possible similar to the Java Collection framework</a:t>
+            </a:r>
+          </a:p>
+          <a:p>
+            <a:r>
+              <a:rPr lang="en-US" dirty="0"/>
+              <a:t>The most basic interface is the </a:t>
+            </a:r>
+            <a:r>
+              <a:rPr lang="en-US" dirty="0" err="1"/>
+              <a:t>CollectionNumber</a:t>
+            </a:r>
+            <a:r>
+              <a:rPr lang="en-US" dirty="0"/>
+              <a:t> that, through the </a:t>
+            </a:r>
+            <a:r>
+              <a:rPr lang="en-US" dirty="0" err="1"/>
+              <a:t>IteratorNumber</a:t>
+            </a:r>
+            <a:r>
+              <a:rPr lang="en-US" dirty="0"/>
+              <a:t>, allows iteration through a generic collection of primitives </a:t>
+            </a:r>
+          </a:p>
+          <a:p>
+            <a:r>
+              <a:rPr lang="en-US" dirty="0" err="1"/>
+              <a:t>org.epics.util.array</a:t>
+            </a:r>
+            <a:r>
+              <a:rPr lang="en-US" dirty="0"/>
+              <a:t> provides support for numeric collections</a:t>
+            </a:r>
+          </a:p>
+          <a:p>
+            <a:pPr lvl="1"/>
+            <a:r>
+              <a:rPr lang="en-US" dirty="0"/>
+              <a:t>Allows iterating on a set of numbers regardless of their type</a:t>
+            </a:r>
+          </a:p>
+          <a:p>
+            <a:pPr lvl="1"/>
+            <a:r>
+              <a:rPr lang="en-US" dirty="0"/>
+              <a:t>Allows creating read-only wrappers</a:t>
+            </a:r>
+          </a:p>
+          <a:p>
+            <a:pPr lvl="1"/>
+            <a:r>
+              <a:rPr lang="en-US" dirty="0"/>
+              <a:t>Allows implementing arrays that are lazily calculated</a:t>
+            </a:r>
+          </a:p>
+          <a:p>
+            <a:pPr lvl="1"/>
+            <a:r>
+              <a:rPr lang="en-US" dirty="0"/>
+              <a:t>If using the concrete array implementations, the performance is guaranteed to be the same as using arrays directly</a:t>
+            </a:r>
+          </a:p>
+          <a:p>
+            <a:r>
+              <a:rPr lang="en-US" dirty="0"/>
+              <a:t>Includes interfaces/implementations for all 10 numeric types (2 floating point, 4 integers, 4 unsigned integers)</a:t>
+            </a:r>
+          </a:p>
+        </p:txBody>
+      </p:sp>
+    </p:spTree>
+    <p:extLst>
+      <p:ext uri="{BB962C8B-B14F-4D97-AF65-F5344CB8AC3E}">
+        <p14:creationId xmlns:p14="http://schemas.microsoft.com/office/powerpoint/2010/main" val="1240117095"/>
+      </p:ext>
+    </p:extLst>
+  </p:cSld>
+  <p:clrMapOvr>
+    <a:masterClrMapping/>
+  </p:clrMapOvr>
+</p:sld>
+</file>
+
+<file path=ppt/slides/slide16.xml><?xml version="1.0" encoding="utf-8"?>
 <p:sld xmlns:a="http://schemas.openxmlformats.org/drawingml/2006/main" xmlns:r="http://schemas.openxmlformats.org/officeDocument/2006/relationships" xmlns:p="http://schemas.openxmlformats.org/presentationml/2006/main">
   <p:cSld>
     <p:spTree>

</xml_diff>